<commit_message>
Functional approach presentation added
</commit_message>
<xml_diff>
--- a/Functions/Functions part 2.pptx
+++ b/Functions/Functions part 2.pptx
@@ -243,7 +243,7 @@
           <a:p>
             <a:fld id="{1AC4E562-BB57-45BF-B219-CF5327416608}" type="datetimeFigureOut">
               <a:rPr lang="uk-UA" smtClean="0"/>
-              <a:t>19.02.2020</a:t>
+              <a:t>20.02.2020</a:t>
             </a:fld>
             <a:endParaRPr lang="uk-UA"/>
           </a:p>
@@ -12263,8 +12263,12 @@
               <a:t>returns a bound function that, when executed later, will have the correct context (</a:t>
             </a:r>
             <a:r>
-              <a:rPr lang="en-US" b="1" dirty="0"/>
-              <a:t>"this"</a:t>
+              <a:rPr lang="en-US" dirty="0">
+                <a:solidFill>
+                  <a:schemeClr val="accent6"/>
+                </a:solidFill>
+              </a:rPr>
+              <a:t>this</a:t>
             </a:r>
             <a:r>
               <a:rPr lang="en-US" dirty="0"/>
@@ -13886,20 +13890,20 @@
 </file>
 
 <file path=customXml/item1.xml><?xml version="1.0" encoding="utf-8"?>
-<p:properties xmlns:p="http://schemas.microsoft.com/office/2006/metadata/properties" xmlns:xsi="http://www.w3.org/2001/XMLSchema-instance" xmlns:pc="http://schemas.microsoft.com/office/infopath/2007/PartnerControls">
-  <documentManagement>
-    <_x041a__x043e__x043c__x0435__x0442__x0430__x0440_ xmlns="835f28f2-30f1-4728-84d2-86d96e143488" xsi:nil="true"/>
-  </documentManagement>
-</p:properties>
-</file>
-
-<file path=customXml/item2.xml><?xml version="1.0" encoding="utf-8"?>
 <?mso-contentType ?>
 <FormTemplates xmlns="http://schemas.microsoft.com/sharepoint/v3/contenttype/forms">
   <Display>DocumentLibraryForm</Display>
   <Edit>DocumentLibraryForm</Edit>
   <New>DocumentLibraryForm</New>
 </FormTemplates>
+</file>
+
+<file path=customXml/item2.xml><?xml version="1.0" encoding="utf-8"?>
+<p:properties xmlns:p="http://schemas.microsoft.com/office/2006/metadata/properties" xmlns:xsi="http://www.w3.org/2001/XMLSchema-instance" xmlns:pc="http://schemas.microsoft.com/office/infopath/2007/PartnerControls">
+  <documentManagement>
+    <_x041a__x043e__x043c__x0435__x0442__x0430__x0440_ xmlns="835f28f2-30f1-4728-84d2-86d96e143488" xsi:nil="true"/>
+  </documentManagement>
+</p:properties>
 </file>
 
 <file path=customXml/item3.xml><?xml version="1.0" encoding="utf-8"?>
@@ -14102,6 +14106,14 @@
 </file>
 
 <file path=customXml/itemProps1.xml><?xml version="1.0" encoding="utf-8"?>
+<ds:datastoreItem xmlns:ds="http://schemas.openxmlformats.org/officeDocument/2006/customXml" ds:itemID="{296B3B9E-03D8-4766-BF45-6129617CF026}">
+  <ds:schemaRefs>
+    <ds:schemaRef ds:uri="http://schemas.microsoft.com/sharepoint/v3/contenttype/forms"/>
+  </ds:schemaRefs>
+</ds:datastoreItem>
+</file>
+
+<file path=customXml/itemProps2.xml><?xml version="1.0" encoding="utf-8"?>
 <ds:datastoreItem xmlns:ds="http://schemas.openxmlformats.org/officeDocument/2006/customXml" ds:itemID="{B3A1340B-3A1B-4156-ADE3-51DF6C2C795D}">
   <ds:schemaRefs>
     <ds:schemaRef ds:uri="http://schemas.microsoft.com/office/2006/documentManagement/types"/>
@@ -14114,14 +14126,6 @@
     <ds:schemaRef ds:uri="http://schemas.openxmlformats.org/package/2006/metadata/core-properties"/>
     <ds:schemaRef ds:uri="http://schemas.microsoft.com/office/2006/metadata/properties"/>
     <ds:schemaRef ds:uri="http://www.w3.org/XML/1998/namespace"/>
-  </ds:schemaRefs>
-</ds:datastoreItem>
-</file>
-
-<file path=customXml/itemProps2.xml><?xml version="1.0" encoding="utf-8"?>
-<ds:datastoreItem xmlns:ds="http://schemas.openxmlformats.org/officeDocument/2006/customXml" ds:itemID="{296B3B9E-03D8-4766-BF45-6129617CF026}">
-  <ds:schemaRefs>
-    <ds:schemaRef ds:uri="http://schemas.microsoft.com/sharepoint/v3/contenttype/forms"/>
   </ds:schemaRefs>
 </ds:datastoreItem>
 </file>

</xml_diff>